<commit_message>
Slight Update to Mock Slides
</commit_message>
<xml_diff>
--- a/Mock Slides.pptx
+++ b/Mock Slides.pptx
@@ -108,6 +108,11 @@
       </a:defRPr>
     </a:lvl9pPr>
   </p:defaultTextStyle>
+  <p:extLst>
+    <p:ext uri="{EFAFB233-063F-42B5-8137-9DF3F51BA10A}">
+      <p15:sldGuideLst xmlns:p15="http://schemas.microsoft.com/office/powerpoint/2012/main"/>
+    </p:ext>
+  </p:extLst>
 </p:presentation>
 </file>
 
@@ -258,7 +263,7 @@
           <a:p>
             <a:fld id="{F30025CF-58C4-46C0-A704-FC20BC618B8C}" type="datetimeFigureOut">
               <a:rPr lang="en-US" smtClean="0"/>
-              <a:t>3/27/2024</a:t>
+              <a:t>3/28/2024</a:t>
             </a:fld>
             <a:endParaRPr lang="en-US"/>
           </a:p>
@@ -456,7 +461,7 @@
           <a:p>
             <a:fld id="{F30025CF-58C4-46C0-A704-FC20BC618B8C}" type="datetimeFigureOut">
               <a:rPr lang="en-US" smtClean="0"/>
-              <a:t>3/27/2024</a:t>
+              <a:t>3/28/2024</a:t>
             </a:fld>
             <a:endParaRPr lang="en-US"/>
           </a:p>
@@ -664,7 +669,7 @@
           <a:p>
             <a:fld id="{F30025CF-58C4-46C0-A704-FC20BC618B8C}" type="datetimeFigureOut">
               <a:rPr lang="en-US" smtClean="0"/>
-              <a:t>3/27/2024</a:t>
+              <a:t>3/28/2024</a:t>
             </a:fld>
             <a:endParaRPr lang="en-US"/>
           </a:p>
@@ -862,7 +867,7 @@
           <a:p>
             <a:fld id="{F30025CF-58C4-46C0-A704-FC20BC618B8C}" type="datetimeFigureOut">
               <a:rPr lang="en-US" smtClean="0"/>
-              <a:t>3/27/2024</a:t>
+              <a:t>3/28/2024</a:t>
             </a:fld>
             <a:endParaRPr lang="en-US"/>
           </a:p>
@@ -1137,7 +1142,7 @@
           <a:p>
             <a:fld id="{F30025CF-58C4-46C0-A704-FC20BC618B8C}" type="datetimeFigureOut">
               <a:rPr lang="en-US" smtClean="0"/>
-              <a:t>3/27/2024</a:t>
+              <a:t>3/28/2024</a:t>
             </a:fld>
             <a:endParaRPr lang="en-US"/>
           </a:p>
@@ -1402,7 +1407,7 @@
           <a:p>
             <a:fld id="{F30025CF-58C4-46C0-A704-FC20BC618B8C}" type="datetimeFigureOut">
               <a:rPr lang="en-US" smtClean="0"/>
-              <a:t>3/27/2024</a:t>
+              <a:t>3/28/2024</a:t>
             </a:fld>
             <a:endParaRPr lang="en-US"/>
           </a:p>
@@ -1814,7 +1819,7 @@
           <a:p>
             <a:fld id="{F30025CF-58C4-46C0-A704-FC20BC618B8C}" type="datetimeFigureOut">
               <a:rPr lang="en-US" smtClean="0"/>
-              <a:t>3/27/2024</a:t>
+              <a:t>3/28/2024</a:t>
             </a:fld>
             <a:endParaRPr lang="en-US"/>
           </a:p>
@@ -1955,7 +1960,7 @@
           <a:p>
             <a:fld id="{F30025CF-58C4-46C0-A704-FC20BC618B8C}" type="datetimeFigureOut">
               <a:rPr lang="en-US" smtClean="0"/>
-              <a:t>3/27/2024</a:t>
+              <a:t>3/28/2024</a:t>
             </a:fld>
             <a:endParaRPr lang="en-US"/>
           </a:p>
@@ -2068,7 +2073,7 @@
           <a:p>
             <a:fld id="{F30025CF-58C4-46C0-A704-FC20BC618B8C}" type="datetimeFigureOut">
               <a:rPr lang="en-US" smtClean="0"/>
-              <a:t>3/27/2024</a:t>
+              <a:t>3/28/2024</a:t>
             </a:fld>
             <a:endParaRPr lang="en-US"/>
           </a:p>
@@ -2379,7 +2384,7 @@
           <a:p>
             <a:fld id="{F30025CF-58C4-46C0-A704-FC20BC618B8C}" type="datetimeFigureOut">
               <a:rPr lang="en-US" smtClean="0"/>
-              <a:t>3/27/2024</a:t>
+              <a:t>3/28/2024</a:t>
             </a:fld>
             <a:endParaRPr lang="en-US"/>
           </a:p>
@@ -2667,7 +2672,7 @@
           <a:p>
             <a:fld id="{F30025CF-58C4-46C0-A704-FC20BC618B8C}" type="datetimeFigureOut">
               <a:rPr lang="en-US" smtClean="0"/>
-              <a:t>3/27/2024</a:t>
+              <a:t>3/28/2024</a:t>
             </a:fld>
             <a:endParaRPr lang="en-US"/>
           </a:p>
@@ -2908,7 +2913,7 @@
           <a:p>
             <a:fld id="{F30025CF-58C4-46C0-A704-FC20BC618B8C}" type="datetimeFigureOut">
               <a:rPr lang="en-US" smtClean="0"/>
-              <a:t>3/27/2024</a:t>
+              <a:t>3/28/2024</a:t>
             </a:fld>
             <a:endParaRPr lang="en-US"/>
           </a:p>
@@ -3615,7 +3620,7 @@
         <p:spPr>
           <a:xfrm>
             <a:off x="1208314" y="3234502"/>
-            <a:ext cx="1556657" cy="1477328"/>
+            <a:ext cx="1556657" cy="2031325"/>
           </a:xfrm>
           <a:prstGeom prst="rect">
             <a:avLst/>
@@ -3662,7 +3667,17 @@
             </a:pPr>
             <a:r>
               <a:rPr lang="en-US" dirty="0"/>
-              <a:t>Facilities </a:t>
+              <a:t>Facilities</a:t>
+            </a:r>
+          </a:p>
+          <a:p>
+            <a:pPr marL="285750" indent="-285750">
+              <a:buFont typeface="Wingdings" panose="05000000000000000000" pitchFamily="2" charset="2"/>
+              <a:buChar char="q"/>
+            </a:pPr>
+            <a:r>
+              <a:rPr lang="en-US" dirty="0"/>
+              <a:t>Student Resources </a:t>
             </a:r>
           </a:p>
         </p:txBody>
@@ -4032,6 +4047,126 @@
           </a:p>
         </p:txBody>
       </p:sp>
+      <p:sp>
+        <p:nvSpPr>
+          <p:cNvPr id="3" name="TextBox 2">
+            <a:extLst>
+              <a:ext uri="{FF2B5EF4-FFF2-40B4-BE49-F238E27FC236}">
+                <a16:creationId xmlns:a16="http://schemas.microsoft.com/office/drawing/2014/main" id="{7D7DC4D6-9D2C-AC13-6A5F-CFD77442C199}"/>
+              </a:ext>
+            </a:extLst>
+          </p:cNvPr>
+          <p:cNvSpPr txBox="1"/>
+          <p:nvPr/>
+        </p:nvSpPr>
+        <p:spPr>
+          <a:xfrm>
+            <a:off x="5744412" y="5871831"/>
+            <a:ext cx="2373085" cy="369332"/>
+          </a:xfrm>
+          <a:prstGeom prst="rect">
+            <a:avLst/>
+          </a:prstGeom>
+          <a:noFill/>
+        </p:spPr>
+        <p:txBody>
+          <a:bodyPr wrap="square" rtlCol="0">
+            <a:spAutoFit/>
+          </a:bodyPr>
+          <a:lstStyle/>
+          <a:p>
+            <a:r>
+              <a:rPr lang="en-US" dirty="0"/>
+              <a:t>Resources 1-12</a:t>
+            </a:r>
+          </a:p>
+        </p:txBody>
+      </p:sp>
+      <p:sp>
+        <p:nvSpPr>
+          <p:cNvPr id="5" name="Rectangle 4">
+            <a:extLst>
+              <a:ext uri="{FF2B5EF4-FFF2-40B4-BE49-F238E27FC236}">
+                <a16:creationId xmlns:a16="http://schemas.microsoft.com/office/drawing/2014/main" id="{E7669FA3-B478-BD03-FA40-259F8399DE3D}"/>
+              </a:ext>
+            </a:extLst>
+          </p:cNvPr>
+          <p:cNvSpPr/>
+          <p:nvPr/>
+        </p:nvSpPr>
+        <p:spPr>
+          <a:xfrm>
+            <a:off x="3522446" y="2595548"/>
+            <a:ext cx="883299" cy="285822"/>
+          </a:xfrm>
+          <a:prstGeom prst="rect">
+            <a:avLst/>
+          </a:prstGeom>
+        </p:spPr>
+        <p:style>
+          <a:lnRef idx="2">
+            <a:schemeClr val="accent1">
+              <a:shade val="15000"/>
+            </a:schemeClr>
+          </a:lnRef>
+          <a:fillRef idx="1">
+            <a:schemeClr val="accent1"/>
+          </a:fillRef>
+          <a:effectRef idx="0">
+            <a:schemeClr val="accent1"/>
+          </a:effectRef>
+          <a:fontRef idx="minor">
+            <a:schemeClr val="lt1"/>
+          </a:fontRef>
+        </p:style>
+        <p:txBody>
+          <a:bodyPr rtlCol="0" anchor="ctr"/>
+          <a:lstStyle/>
+          <a:p>
+            <a:pPr algn="ctr"/>
+            <a:endParaRPr lang="en-US"/>
+          </a:p>
+        </p:txBody>
+      </p:sp>
+      <p:sp>
+        <p:nvSpPr>
+          <p:cNvPr id="7" name="TextBox 6">
+            <a:extLst>
+              <a:ext uri="{FF2B5EF4-FFF2-40B4-BE49-F238E27FC236}">
+                <a16:creationId xmlns:a16="http://schemas.microsoft.com/office/drawing/2014/main" id="{3C277B45-34E2-BEFF-8688-67E45C4995ED}"/>
+              </a:ext>
+            </a:extLst>
+          </p:cNvPr>
+          <p:cNvSpPr txBox="1"/>
+          <p:nvPr/>
+        </p:nvSpPr>
+        <p:spPr>
+          <a:xfrm>
+            <a:off x="3564154" y="2565680"/>
+            <a:ext cx="942532" cy="369332"/>
+          </a:xfrm>
+          <a:prstGeom prst="rect">
+            <a:avLst/>
+          </a:prstGeom>
+          <a:noFill/>
+        </p:spPr>
+        <p:txBody>
+          <a:bodyPr wrap="square" rtlCol="0">
+            <a:spAutoFit/>
+          </a:bodyPr>
+          <a:lstStyle/>
+          <a:p>
+            <a:r>
+              <a:rPr lang="en-US" dirty="0">
+                <a:solidFill>
+                  <a:schemeClr val="bg1"/>
+                </a:solidFill>
+              </a:rPr>
+              <a:t>Search</a:t>
+            </a:r>
+          </a:p>
+        </p:txBody>
+      </p:sp>
     </p:spTree>
     <p:extLst>
       <p:ext uri="{BB962C8B-B14F-4D97-AF65-F5344CB8AC3E}">
@@ -4357,7 +4492,7 @@
         <p:spPr>
           <a:xfrm>
             <a:off x="1208314" y="3234502"/>
-            <a:ext cx="1556657" cy="1477328"/>
+            <a:ext cx="1556657" cy="2031325"/>
           </a:xfrm>
           <a:prstGeom prst="rect">
             <a:avLst/>
@@ -4405,6 +4540,16 @@
             <a:r>
               <a:rPr lang="en-US" dirty="0"/>
               <a:t>Facilities </a:t>
+            </a:r>
+          </a:p>
+          <a:p>
+            <a:pPr marL="285750" indent="-285750">
+              <a:buFont typeface="Wingdings" panose="05000000000000000000" pitchFamily="2" charset="2"/>
+              <a:buChar char="q"/>
+            </a:pPr>
+            <a:r>
+              <a:rPr lang="en-US" dirty="0"/>
+              <a:t>Student Resources</a:t>
             </a:r>
           </a:p>
         </p:txBody>
@@ -4774,6 +4919,165 @@
           </a:p>
         </p:txBody>
       </p:sp>
+      <p:sp>
+        <p:nvSpPr>
+          <p:cNvPr id="3" name="TextBox 2">
+            <a:extLst>
+              <a:ext uri="{FF2B5EF4-FFF2-40B4-BE49-F238E27FC236}">
+                <a16:creationId xmlns:a16="http://schemas.microsoft.com/office/drawing/2014/main" id="{2EA2A7BB-AD8E-20A4-1C4F-F776BAB201F2}"/>
+              </a:ext>
+            </a:extLst>
+          </p:cNvPr>
+          <p:cNvSpPr txBox="1"/>
+          <p:nvPr/>
+        </p:nvSpPr>
+        <p:spPr>
+          <a:xfrm>
+            <a:off x="5744412" y="5871831"/>
+            <a:ext cx="2373085" cy="369332"/>
+          </a:xfrm>
+          <a:prstGeom prst="rect">
+            <a:avLst/>
+          </a:prstGeom>
+          <a:noFill/>
+        </p:spPr>
+        <p:txBody>
+          <a:bodyPr wrap="square" rtlCol="0">
+            <a:spAutoFit/>
+          </a:bodyPr>
+          <a:lstStyle/>
+          <a:p>
+            <a:r>
+              <a:rPr lang="en-US" dirty="0"/>
+              <a:t>Resources 1-12</a:t>
+            </a:r>
+          </a:p>
+        </p:txBody>
+      </p:sp>
+      <p:sp>
+        <p:nvSpPr>
+          <p:cNvPr id="5" name="Rectangle 4">
+            <a:extLst>
+              <a:ext uri="{FF2B5EF4-FFF2-40B4-BE49-F238E27FC236}">
+                <a16:creationId xmlns:a16="http://schemas.microsoft.com/office/drawing/2014/main" id="{750FB625-DA48-52E1-F9CE-4C85C13ACF7B}"/>
+              </a:ext>
+            </a:extLst>
+          </p:cNvPr>
+          <p:cNvSpPr/>
+          <p:nvPr/>
+        </p:nvSpPr>
+        <p:spPr>
+          <a:xfrm>
+            <a:off x="3522446" y="2595548"/>
+            <a:ext cx="883299" cy="285822"/>
+          </a:xfrm>
+          <a:prstGeom prst="rect">
+            <a:avLst/>
+          </a:prstGeom>
+        </p:spPr>
+        <p:style>
+          <a:lnRef idx="2">
+            <a:schemeClr val="accent1">
+              <a:shade val="15000"/>
+            </a:schemeClr>
+          </a:lnRef>
+          <a:fillRef idx="1">
+            <a:schemeClr val="accent1"/>
+          </a:fillRef>
+          <a:effectRef idx="0">
+            <a:schemeClr val="accent1"/>
+          </a:effectRef>
+          <a:fontRef idx="minor">
+            <a:schemeClr val="lt1"/>
+          </a:fontRef>
+        </p:style>
+        <p:txBody>
+          <a:bodyPr rtlCol="0" anchor="ctr"/>
+          <a:lstStyle/>
+          <a:p>
+            <a:pPr algn="ctr"/>
+            <a:endParaRPr lang="en-US"/>
+          </a:p>
+        </p:txBody>
+      </p:sp>
+      <p:sp>
+        <p:nvSpPr>
+          <p:cNvPr id="7" name="TextBox 6">
+            <a:extLst>
+              <a:ext uri="{FF2B5EF4-FFF2-40B4-BE49-F238E27FC236}">
+                <a16:creationId xmlns:a16="http://schemas.microsoft.com/office/drawing/2014/main" id="{E4973945-99FE-A2DE-FA4C-0DF284EF945D}"/>
+              </a:ext>
+            </a:extLst>
+          </p:cNvPr>
+          <p:cNvSpPr txBox="1"/>
+          <p:nvPr/>
+        </p:nvSpPr>
+        <p:spPr>
+          <a:xfrm>
+            <a:off x="3564154" y="2565680"/>
+            <a:ext cx="942532" cy="369332"/>
+          </a:xfrm>
+          <a:prstGeom prst="rect">
+            <a:avLst/>
+          </a:prstGeom>
+          <a:noFill/>
+        </p:spPr>
+        <p:txBody>
+          <a:bodyPr wrap="square" rtlCol="0">
+            <a:spAutoFit/>
+          </a:bodyPr>
+          <a:lstStyle/>
+          <a:p>
+            <a:r>
+              <a:rPr lang="en-US" dirty="0">
+                <a:solidFill>
+                  <a:schemeClr val="bg1"/>
+                </a:solidFill>
+              </a:rPr>
+              <a:t>Search</a:t>
+            </a:r>
+          </a:p>
+        </p:txBody>
+      </p:sp>
+      <p:pic>
+        <p:nvPicPr>
+          <p:cNvPr id="23" name="Picture 22" descr="A black check mark on a white background&#10;&#10;Description automatically generated">
+            <a:extLst>
+              <a:ext uri="{FF2B5EF4-FFF2-40B4-BE49-F238E27FC236}">
+                <a16:creationId xmlns:a16="http://schemas.microsoft.com/office/drawing/2014/main" id="{EC871C08-1602-5EDE-1A96-5997A873EC11}"/>
+              </a:ext>
+            </a:extLst>
+          </p:cNvPr>
+          <p:cNvPicPr>
+            <a:picLocks noChangeAspect="1"/>
+          </p:cNvPicPr>
+          <p:nvPr/>
+        </p:nvPicPr>
+        <p:blipFill>
+          <a:blip r:embed="rId4">
+            <a:extLst>
+              <a:ext uri="{28A0092B-C50C-407E-A947-70E740481C1C}">
+                <a14:useLocalDpi xmlns:a14="http://schemas.microsoft.com/office/drawing/2010/main" val="0"/>
+              </a:ext>
+              <a:ext uri="{837473B0-CC2E-450A-ABE3-18F120FF3D39}">
+                <a1611:picAttrSrcUrl xmlns:a1611="http://schemas.microsoft.com/office/drawing/2016/11/main" r:id="rId5"/>
+              </a:ext>
+            </a:extLst>
+          </a:blip>
+          <a:stretch>
+            <a:fillRect/>
+          </a:stretch>
+        </p:blipFill>
+        <p:spPr>
+          <a:xfrm>
+            <a:off x="1312347" y="3575700"/>
+            <a:ext cx="162046" cy="162046"/>
+          </a:xfrm>
+          <a:prstGeom prst="rect">
+            <a:avLst/>
+          </a:prstGeom>
+        </p:spPr>
+      </p:pic>
     </p:spTree>
     <p:extLst>
       <p:ext uri="{BB962C8B-B14F-4D97-AF65-F5344CB8AC3E}">
@@ -5099,7 +5403,7 @@
         <p:spPr>
           <a:xfrm>
             <a:off x="1208314" y="3234502"/>
-            <a:ext cx="1556657" cy="1477328"/>
+            <a:ext cx="1556657" cy="2031325"/>
           </a:xfrm>
           <a:prstGeom prst="rect">
             <a:avLst/>
@@ -5146,7 +5450,17 @@
             </a:pPr>
             <a:r>
               <a:rPr lang="en-US" dirty="0"/>
-              <a:t>Facilities </a:t>
+              <a:t>Facilities</a:t>
+            </a:r>
+          </a:p>
+          <a:p>
+            <a:pPr marL="285750" indent="-285750">
+              <a:buFont typeface="Wingdings" panose="05000000000000000000" pitchFamily="2" charset="2"/>
+              <a:buChar char="q"/>
+            </a:pPr>
+            <a:r>
+              <a:rPr lang="en-US" dirty="0"/>
+              <a:t>Student Resources </a:t>
             </a:r>
           </a:p>
         </p:txBody>
@@ -5516,6 +5830,165 @@
           </a:p>
         </p:txBody>
       </p:sp>
+      <p:sp>
+        <p:nvSpPr>
+          <p:cNvPr id="3" name="TextBox 2">
+            <a:extLst>
+              <a:ext uri="{FF2B5EF4-FFF2-40B4-BE49-F238E27FC236}">
+                <a16:creationId xmlns:a16="http://schemas.microsoft.com/office/drawing/2014/main" id="{AF30728C-1362-F55D-C473-5D3E022A8196}"/>
+              </a:ext>
+            </a:extLst>
+          </p:cNvPr>
+          <p:cNvSpPr txBox="1"/>
+          <p:nvPr/>
+        </p:nvSpPr>
+        <p:spPr>
+          <a:xfrm>
+            <a:off x="5744412" y="5871831"/>
+            <a:ext cx="2373085" cy="369332"/>
+          </a:xfrm>
+          <a:prstGeom prst="rect">
+            <a:avLst/>
+          </a:prstGeom>
+          <a:noFill/>
+        </p:spPr>
+        <p:txBody>
+          <a:bodyPr wrap="square" rtlCol="0">
+            <a:spAutoFit/>
+          </a:bodyPr>
+          <a:lstStyle/>
+          <a:p>
+            <a:r>
+              <a:rPr lang="en-US" dirty="0"/>
+              <a:t>Resources 1-12</a:t>
+            </a:r>
+          </a:p>
+        </p:txBody>
+      </p:sp>
+      <p:sp>
+        <p:nvSpPr>
+          <p:cNvPr id="5" name="Rectangle 4">
+            <a:extLst>
+              <a:ext uri="{FF2B5EF4-FFF2-40B4-BE49-F238E27FC236}">
+                <a16:creationId xmlns:a16="http://schemas.microsoft.com/office/drawing/2014/main" id="{DAA5D8A0-7C18-5984-C5F9-1A152AD12693}"/>
+              </a:ext>
+            </a:extLst>
+          </p:cNvPr>
+          <p:cNvSpPr/>
+          <p:nvPr/>
+        </p:nvSpPr>
+        <p:spPr>
+          <a:xfrm>
+            <a:off x="3522446" y="2595548"/>
+            <a:ext cx="883299" cy="285822"/>
+          </a:xfrm>
+          <a:prstGeom prst="rect">
+            <a:avLst/>
+          </a:prstGeom>
+        </p:spPr>
+        <p:style>
+          <a:lnRef idx="2">
+            <a:schemeClr val="accent1">
+              <a:shade val="15000"/>
+            </a:schemeClr>
+          </a:lnRef>
+          <a:fillRef idx="1">
+            <a:schemeClr val="accent1"/>
+          </a:fillRef>
+          <a:effectRef idx="0">
+            <a:schemeClr val="accent1"/>
+          </a:effectRef>
+          <a:fontRef idx="minor">
+            <a:schemeClr val="lt1"/>
+          </a:fontRef>
+        </p:style>
+        <p:txBody>
+          <a:bodyPr rtlCol="0" anchor="ctr"/>
+          <a:lstStyle/>
+          <a:p>
+            <a:pPr algn="ctr"/>
+            <a:endParaRPr lang="en-US"/>
+          </a:p>
+        </p:txBody>
+      </p:sp>
+      <p:sp>
+        <p:nvSpPr>
+          <p:cNvPr id="7" name="TextBox 6">
+            <a:extLst>
+              <a:ext uri="{FF2B5EF4-FFF2-40B4-BE49-F238E27FC236}">
+                <a16:creationId xmlns:a16="http://schemas.microsoft.com/office/drawing/2014/main" id="{9EF691E2-F7B7-5DD1-4EBE-568D30D0C3DE}"/>
+              </a:ext>
+            </a:extLst>
+          </p:cNvPr>
+          <p:cNvSpPr txBox="1"/>
+          <p:nvPr/>
+        </p:nvSpPr>
+        <p:spPr>
+          <a:xfrm>
+            <a:off x="3564154" y="2565680"/>
+            <a:ext cx="942532" cy="369332"/>
+          </a:xfrm>
+          <a:prstGeom prst="rect">
+            <a:avLst/>
+          </a:prstGeom>
+          <a:noFill/>
+        </p:spPr>
+        <p:txBody>
+          <a:bodyPr wrap="square" rtlCol="0">
+            <a:spAutoFit/>
+          </a:bodyPr>
+          <a:lstStyle/>
+          <a:p>
+            <a:r>
+              <a:rPr lang="en-US" dirty="0">
+                <a:solidFill>
+                  <a:schemeClr val="bg1"/>
+                </a:solidFill>
+              </a:rPr>
+              <a:t>Search</a:t>
+            </a:r>
+          </a:p>
+        </p:txBody>
+      </p:sp>
+      <p:pic>
+        <p:nvPicPr>
+          <p:cNvPr id="17" name="Picture 16" descr="A black check mark on a white background&#10;&#10;Description automatically generated">
+            <a:extLst>
+              <a:ext uri="{FF2B5EF4-FFF2-40B4-BE49-F238E27FC236}">
+                <a16:creationId xmlns:a16="http://schemas.microsoft.com/office/drawing/2014/main" id="{872938A6-948B-82EA-8CED-2116E4383D11}"/>
+              </a:ext>
+            </a:extLst>
+          </p:cNvPr>
+          <p:cNvPicPr>
+            <a:picLocks noChangeAspect="1"/>
+          </p:cNvPicPr>
+          <p:nvPr/>
+        </p:nvPicPr>
+        <p:blipFill>
+          <a:blip r:embed="rId4">
+            <a:extLst>
+              <a:ext uri="{28A0092B-C50C-407E-A947-70E740481C1C}">
+                <a14:useLocalDpi xmlns:a14="http://schemas.microsoft.com/office/drawing/2010/main" val="0"/>
+              </a:ext>
+              <a:ext uri="{837473B0-CC2E-450A-ABE3-18F120FF3D39}">
+                <a1611:picAttrSrcUrl xmlns:a1611="http://schemas.microsoft.com/office/drawing/2016/11/main" r:id="rId5"/>
+              </a:ext>
+            </a:extLst>
+          </a:blip>
+          <a:stretch>
+            <a:fillRect/>
+          </a:stretch>
+        </p:blipFill>
+        <p:spPr>
+          <a:xfrm>
+            <a:off x="1312347" y="4118934"/>
+            <a:ext cx="162046" cy="162046"/>
+          </a:xfrm>
+          <a:prstGeom prst="rect">
+            <a:avLst/>
+          </a:prstGeom>
+        </p:spPr>
+      </p:pic>
     </p:spTree>
     <p:extLst>
       <p:ext uri="{BB962C8B-B14F-4D97-AF65-F5344CB8AC3E}">
@@ -5841,7 +6314,7 @@
         <p:spPr>
           <a:xfrm>
             <a:off x="1208314" y="3234502"/>
-            <a:ext cx="1556657" cy="1477328"/>
+            <a:ext cx="1556657" cy="2031325"/>
           </a:xfrm>
           <a:prstGeom prst="rect">
             <a:avLst/>
@@ -5889,6 +6362,16 @@
             <a:r>
               <a:rPr lang="en-US" dirty="0"/>
               <a:t>Facilities </a:t>
+            </a:r>
+          </a:p>
+          <a:p>
+            <a:pPr marL="285750" indent="-285750">
+              <a:buFont typeface="Wingdings" panose="05000000000000000000" pitchFamily="2" charset="2"/>
+              <a:buChar char="q"/>
+            </a:pPr>
+            <a:r>
+              <a:rPr lang="en-US" dirty="0"/>
+              <a:t>Student Resources</a:t>
             </a:r>
           </a:p>
         </p:txBody>
@@ -6258,6 +6741,165 @@
           </a:p>
         </p:txBody>
       </p:sp>
+      <p:sp>
+        <p:nvSpPr>
+          <p:cNvPr id="3" name="TextBox 2">
+            <a:extLst>
+              <a:ext uri="{FF2B5EF4-FFF2-40B4-BE49-F238E27FC236}">
+                <a16:creationId xmlns:a16="http://schemas.microsoft.com/office/drawing/2014/main" id="{72B178FD-CC5B-B217-7B4E-9D641AC84E74}"/>
+              </a:ext>
+            </a:extLst>
+          </p:cNvPr>
+          <p:cNvSpPr txBox="1"/>
+          <p:nvPr/>
+        </p:nvSpPr>
+        <p:spPr>
+          <a:xfrm>
+            <a:off x="5744412" y="5871831"/>
+            <a:ext cx="2373085" cy="369332"/>
+          </a:xfrm>
+          <a:prstGeom prst="rect">
+            <a:avLst/>
+          </a:prstGeom>
+          <a:noFill/>
+        </p:spPr>
+        <p:txBody>
+          <a:bodyPr wrap="square" rtlCol="0">
+            <a:spAutoFit/>
+          </a:bodyPr>
+          <a:lstStyle/>
+          <a:p>
+            <a:r>
+              <a:rPr lang="en-US" dirty="0"/>
+              <a:t>Resources 1-12</a:t>
+            </a:r>
+          </a:p>
+        </p:txBody>
+      </p:sp>
+      <p:sp>
+        <p:nvSpPr>
+          <p:cNvPr id="5" name="Rectangle 4">
+            <a:extLst>
+              <a:ext uri="{FF2B5EF4-FFF2-40B4-BE49-F238E27FC236}">
+                <a16:creationId xmlns:a16="http://schemas.microsoft.com/office/drawing/2014/main" id="{2CE0AA1F-588F-715A-0DE9-8A9A49FA4DD3}"/>
+              </a:ext>
+            </a:extLst>
+          </p:cNvPr>
+          <p:cNvSpPr/>
+          <p:nvPr/>
+        </p:nvSpPr>
+        <p:spPr>
+          <a:xfrm>
+            <a:off x="3522446" y="2595548"/>
+            <a:ext cx="883299" cy="285822"/>
+          </a:xfrm>
+          <a:prstGeom prst="rect">
+            <a:avLst/>
+          </a:prstGeom>
+        </p:spPr>
+        <p:style>
+          <a:lnRef idx="2">
+            <a:schemeClr val="accent1">
+              <a:shade val="15000"/>
+            </a:schemeClr>
+          </a:lnRef>
+          <a:fillRef idx="1">
+            <a:schemeClr val="accent1"/>
+          </a:fillRef>
+          <a:effectRef idx="0">
+            <a:schemeClr val="accent1"/>
+          </a:effectRef>
+          <a:fontRef idx="minor">
+            <a:schemeClr val="lt1"/>
+          </a:fontRef>
+        </p:style>
+        <p:txBody>
+          <a:bodyPr rtlCol="0" anchor="ctr"/>
+          <a:lstStyle/>
+          <a:p>
+            <a:pPr algn="ctr"/>
+            <a:endParaRPr lang="en-US"/>
+          </a:p>
+        </p:txBody>
+      </p:sp>
+      <p:sp>
+        <p:nvSpPr>
+          <p:cNvPr id="7" name="TextBox 6">
+            <a:extLst>
+              <a:ext uri="{FF2B5EF4-FFF2-40B4-BE49-F238E27FC236}">
+                <a16:creationId xmlns:a16="http://schemas.microsoft.com/office/drawing/2014/main" id="{2F84E5DD-2891-2111-651C-E20EA89B6B71}"/>
+              </a:ext>
+            </a:extLst>
+          </p:cNvPr>
+          <p:cNvSpPr txBox="1"/>
+          <p:nvPr/>
+        </p:nvSpPr>
+        <p:spPr>
+          <a:xfrm>
+            <a:off x="3564154" y="2565680"/>
+            <a:ext cx="942532" cy="369332"/>
+          </a:xfrm>
+          <a:prstGeom prst="rect">
+            <a:avLst/>
+          </a:prstGeom>
+          <a:noFill/>
+        </p:spPr>
+        <p:txBody>
+          <a:bodyPr wrap="square" rtlCol="0">
+            <a:spAutoFit/>
+          </a:bodyPr>
+          <a:lstStyle/>
+          <a:p>
+            <a:r>
+              <a:rPr lang="en-US" dirty="0">
+                <a:solidFill>
+                  <a:schemeClr val="bg1"/>
+                </a:solidFill>
+              </a:rPr>
+              <a:t>Search</a:t>
+            </a:r>
+          </a:p>
+        </p:txBody>
+      </p:sp>
+      <p:pic>
+        <p:nvPicPr>
+          <p:cNvPr id="17" name="Picture 16" descr="A black check mark on a white background&#10;&#10;Description automatically generated">
+            <a:extLst>
+              <a:ext uri="{FF2B5EF4-FFF2-40B4-BE49-F238E27FC236}">
+                <a16:creationId xmlns:a16="http://schemas.microsoft.com/office/drawing/2014/main" id="{3BB524BE-9707-224F-AC6D-BBB30E256924}"/>
+              </a:ext>
+            </a:extLst>
+          </p:cNvPr>
+          <p:cNvPicPr>
+            <a:picLocks noChangeAspect="1"/>
+          </p:cNvPicPr>
+          <p:nvPr/>
+        </p:nvPicPr>
+        <p:blipFill>
+          <a:blip r:embed="rId4">
+            <a:extLst>
+              <a:ext uri="{28A0092B-C50C-407E-A947-70E740481C1C}">
+                <a14:useLocalDpi xmlns:a14="http://schemas.microsoft.com/office/drawing/2010/main" val="0"/>
+              </a:ext>
+              <a:ext uri="{837473B0-CC2E-450A-ABE3-18F120FF3D39}">
+                <a1611:picAttrSrcUrl xmlns:a1611="http://schemas.microsoft.com/office/drawing/2016/11/main" r:id="rId5"/>
+              </a:ext>
+            </a:extLst>
+          </a:blip>
+          <a:stretch>
+            <a:fillRect/>
+          </a:stretch>
+        </p:blipFill>
+        <p:spPr>
+          <a:xfrm>
+            <a:off x="1312347" y="4390877"/>
+            <a:ext cx="162046" cy="162046"/>
+          </a:xfrm>
+          <a:prstGeom prst="rect">
+            <a:avLst/>
+          </a:prstGeom>
+        </p:spPr>
+      </p:pic>
     </p:spTree>
     <p:extLst>
       <p:ext uri="{BB962C8B-B14F-4D97-AF65-F5344CB8AC3E}">
@@ -6496,7 +7138,7 @@
         </p:nvSpPr>
         <p:spPr>
           <a:xfrm>
-            <a:off x="1262743" y="2773819"/>
+            <a:off x="1148443" y="2575324"/>
             <a:ext cx="9895114" cy="369332"/>
           </a:xfrm>
           <a:prstGeom prst="rect">
@@ -6513,6 +7155,324 @@
             <a:r>
               <a:rPr lang="en-US" dirty="0"/>
               <a:t>What type of resource do you want to submit?</a:t>
+            </a:r>
+          </a:p>
+        </p:txBody>
+      </p:sp>
+      <p:sp>
+        <p:nvSpPr>
+          <p:cNvPr id="7" name="Rectangle 6">
+            <a:extLst>
+              <a:ext uri="{FF2B5EF4-FFF2-40B4-BE49-F238E27FC236}">
+                <a16:creationId xmlns:a16="http://schemas.microsoft.com/office/drawing/2014/main" id="{50153D0C-E696-4DE9-486F-D57DC3390C62}"/>
+              </a:ext>
+            </a:extLst>
+          </p:cNvPr>
+          <p:cNvSpPr/>
+          <p:nvPr/>
+        </p:nvSpPr>
+        <p:spPr>
+          <a:xfrm>
+            <a:off x="1241329" y="3044728"/>
+            <a:ext cx="3298372" cy="446315"/>
+          </a:xfrm>
+          <a:prstGeom prst="rect">
+            <a:avLst/>
+          </a:prstGeom>
+          <a:solidFill>
+            <a:schemeClr val="bg1"/>
+          </a:solidFill>
+        </p:spPr>
+        <p:style>
+          <a:lnRef idx="2">
+            <a:schemeClr val="accent1">
+              <a:shade val="15000"/>
+            </a:schemeClr>
+          </a:lnRef>
+          <a:fillRef idx="1">
+            <a:schemeClr val="accent1"/>
+          </a:fillRef>
+          <a:effectRef idx="0">
+            <a:schemeClr val="accent1"/>
+          </a:effectRef>
+          <a:fontRef idx="minor">
+            <a:schemeClr val="lt1"/>
+          </a:fontRef>
+        </p:style>
+        <p:txBody>
+          <a:bodyPr rtlCol="0" anchor="ctr"/>
+          <a:lstStyle/>
+          <a:p>
+            <a:pPr algn="ctr"/>
+            <a:endParaRPr lang="en-US" dirty="0"/>
+          </a:p>
+        </p:txBody>
+      </p:sp>
+      <p:sp>
+        <p:nvSpPr>
+          <p:cNvPr id="8" name="TextBox 7">
+            <a:extLst>
+              <a:ext uri="{FF2B5EF4-FFF2-40B4-BE49-F238E27FC236}">
+                <a16:creationId xmlns:a16="http://schemas.microsoft.com/office/drawing/2014/main" id="{C1B478F8-D918-4974-83B7-494472637168}"/>
+              </a:ext>
+            </a:extLst>
+          </p:cNvPr>
+          <p:cNvSpPr txBox="1"/>
+          <p:nvPr/>
+        </p:nvSpPr>
+        <p:spPr>
+          <a:xfrm>
+            <a:off x="1306744" y="3091883"/>
+            <a:ext cx="2057402" cy="369332"/>
+          </a:xfrm>
+          <a:prstGeom prst="rect">
+            <a:avLst/>
+          </a:prstGeom>
+          <a:solidFill>
+            <a:schemeClr val="bg1"/>
+          </a:solidFill>
+        </p:spPr>
+        <p:txBody>
+          <a:bodyPr wrap="square" rtlCol="0">
+            <a:spAutoFit/>
+          </a:bodyPr>
+          <a:lstStyle/>
+          <a:p>
+            <a:r>
+              <a:rPr lang="en-US" dirty="0"/>
+              <a:t>Search Resources</a:t>
+            </a:r>
+          </a:p>
+        </p:txBody>
+      </p:sp>
+      <p:sp>
+        <p:nvSpPr>
+          <p:cNvPr id="11" name="Rectangle 10">
+            <a:extLst>
+              <a:ext uri="{FF2B5EF4-FFF2-40B4-BE49-F238E27FC236}">
+                <a16:creationId xmlns:a16="http://schemas.microsoft.com/office/drawing/2014/main" id="{4A325397-ED75-0FAE-C493-4EFB0726B218}"/>
+              </a:ext>
+            </a:extLst>
+          </p:cNvPr>
+          <p:cNvSpPr/>
+          <p:nvPr/>
+        </p:nvSpPr>
+        <p:spPr>
+          <a:xfrm>
+            <a:off x="3571332" y="3118032"/>
+            <a:ext cx="883299" cy="285822"/>
+          </a:xfrm>
+          <a:prstGeom prst="rect">
+            <a:avLst/>
+          </a:prstGeom>
+        </p:spPr>
+        <p:style>
+          <a:lnRef idx="2">
+            <a:schemeClr val="accent1">
+              <a:shade val="15000"/>
+            </a:schemeClr>
+          </a:lnRef>
+          <a:fillRef idx="1">
+            <a:schemeClr val="accent1"/>
+          </a:fillRef>
+          <a:effectRef idx="0">
+            <a:schemeClr val="accent1"/>
+          </a:effectRef>
+          <a:fontRef idx="minor">
+            <a:schemeClr val="lt1"/>
+          </a:fontRef>
+        </p:style>
+        <p:txBody>
+          <a:bodyPr rtlCol="0" anchor="ctr"/>
+          <a:lstStyle/>
+          <a:p>
+            <a:pPr algn="ctr"/>
+            <a:endParaRPr lang="en-US"/>
+          </a:p>
+        </p:txBody>
+      </p:sp>
+      <p:sp>
+        <p:nvSpPr>
+          <p:cNvPr id="10" name="TextBox 9">
+            <a:extLst>
+              <a:ext uri="{FF2B5EF4-FFF2-40B4-BE49-F238E27FC236}">
+                <a16:creationId xmlns:a16="http://schemas.microsoft.com/office/drawing/2014/main" id="{3285B259-8C35-EFE1-42AD-47FF24C4C84E}"/>
+              </a:ext>
+            </a:extLst>
+          </p:cNvPr>
+          <p:cNvSpPr txBox="1"/>
+          <p:nvPr/>
+        </p:nvSpPr>
+        <p:spPr>
+          <a:xfrm>
+            <a:off x="3597169" y="3076277"/>
+            <a:ext cx="942532" cy="369332"/>
+          </a:xfrm>
+          <a:prstGeom prst="rect">
+            <a:avLst/>
+          </a:prstGeom>
+          <a:noFill/>
+        </p:spPr>
+        <p:txBody>
+          <a:bodyPr wrap="square" rtlCol="0">
+            <a:spAutoFit/>
+          </a:bodyPr>
+          <a:lstStyle/>
+          <a:p>
+            <a:r>
+              <a:rPr lang="en-US" dirty="0">
+                <a:solidFill>
+                  <a:schemeClr val="bg1"/>
+                </a:solidFill>
+              </a:rPr>
+              <a:t>Search</a:t>
+            </a:r>
+          </a:p>
+        </p:txBody>
+      </p:sp>
+      <p:sp>
+        <p:nvSpPr>
+          <p:cNvPr id="14" name="TextBox 13">
+            <a:extLst>
+              <a:ext uri="{FF2B5EF4-FFF2-40B4-BE49-F238E27FC236}">
+                <a16:creationId xmlns:a16="http://schemas.microsoft.com/office/drawing/2014/main" id="{05C40C7D-BCF5-0DD3-E3D1-DCFE195D975F}"/>
+              </a:ext>
+            </a:extLst>
+          </p:cNvPr>
+          <p:cNvSpPr txBox="1"/>
+          <p:nvPr/>
+        </p:nvSpPr>
+        <p:spPr>
+          <a:xfrm>
+            <a:off x="2306828" y="3577010"/>
+            <a:ext cx="961271" cy="369332"/>
+          </a:xfrm>
+          <a:prstGeom prst="rect">
+            <a:avLst/>
+          </a:prstGeom>
+          <a:noFill/>
+        </p:spPr>
+        <p:txBody>
+          <a:bodyPr wrap="square" rtlCol="0">
+            <a:spAutoFit/>
+          </a:bodyPr>
+          <a:lstStyle/>
+          <a:p>
+            <a:r>
+              <a:rPr lang="en-US" dirty="0">
+                <a:solidFill>
+                  <a:schemeClr val="bg1"/>
+                </a:solidFill>
+              </a:rPr>
+              <a:t>Search</a:t>
+            </a:r>
+          </a:p>
+        </p:txBody>
+      </p:sp>
+      <p:sp>
+        <p:nvSpPr>
+          <p:cNvPr id="16" name="Rectangle 15">
+            <a:extLst>
+              <a:ext uri="{FF2B5EF4-FFF2-40B4-BE49-F238E27FC236}">
+                <a16:creationId xmlns:a16="http://schemas.microsoft.com/office/drawing/2014/main" id="{4A5D7CC8-E940-DC9A-A5AF-051BCA4C0A3C}"/>
+              </a:ext>
+            </a:extLst>
+          </p:cNvPr>
+          <p:cNvSpPr/>
+          <p:nvPr/>
+        </p:nvSpPr>
+        <p:spPr>
+          <a:xfrm>
+            <a:off x="1241329" y="3577010"/>
+            <a:ext cx="4922190" cy="2499699"/>
+          </a:xfrm>
+          <a:prstGeom prst="rect">
+            <a:avLst/>
+          </a:prstGeom>
+          <a:solidFill>
+            <a:schemeClr val="bg1"/>
+          </a:solidFill>
+        </p:spPr>
+        <p:style>
+          <a:lnRef idx="2">
+            <a:schemeClr val="accent1">
+              <a:shade val="15000"/>
+            </a:schemeClr>
+          </a:lnRef>
+          <a:fillRef idx="1">
+            <a:schemeClr val="accent1"/>
+          </a:fillRef>
+          <a:effectRef idx="0">
+            <a:schemeClr val="accent1"/>
+          </a:effectRef>
+          <a:fontRef idx="minor">
+            <a:schemeClr val="lt1"/>
+          </a:fontRef>
+        </p:style>
+        <p:txBody>
+          <a:bodyPr rtlCol="0" anchor="ctr"/>
+          <a:lstStyle/>
+          <a:p>
+            <a:pPr algn="ctr"/>
+            <a:endParaRPr lang="en-US"/>
+          </a:p>
+        </p:txBody>
+      </p:sp>
+      <p:sp>
+        <p:nvSpPr>
+          <p:cNvPr id="17" name="TextBox 16">
+            <a:extLst>
+              <a:ext uri="{FF2B5EF4-FFF2-40B4-BE49-F238E27FC236}">
+                <a16:creationId xmlns:a16="http://schemas.microsoft.com/office/drawing/2014/main" id="{74610DF2-1102-D3FC-194F-3D05B1A47ED9}"/>
+              </a:ext>
+            </a:extLst>
+          </p:cNvPr>
+          <p:cNvSpPr txBox="1"/>
+          <p:nvPr/>
+        </p:nvSpPr>
+        <p:spPr>
+          <a:xfrm>
+            <a:off x="1377387" y="3704368"/>
+            <a:ext cx="4718613" cy="923330"/>
+          </a:xfrm>
+          <a:prstGeom prst="rect">
+            <a:avLst/>
+          </a:prstGeom>
+          <a:noFill/>
+        </p:spPr>
+        <p:txBody>
+          <a:bodyPr wrap="square" rtlCol="0">
+            <a:spAutoFit/>
+          </a:bodyPr>
+          <a:lstStyle/>
+          <a:p>
+            <a:pPr marL="285750" indent="-285750">
+              <a:buFont typeface="Wingdings" panose="05000000000000000000" pitchFamily="2" charset="2"/>
+              <a:buChar char="q"/>
+            </a:pPr>
+            <a:r>
+              <a:rPr lang="en-US" dirty="0"/>
+              <a:t>Therapist</a:t>
+            </a:r>
+          </a:p>
+          <a:p>
+            <a:pPr marL="285750" indent="-285750">
+              <a:buFont typeface="Wingdings" panose="05000000000000000000" pitchFamily="2" charset="2"/>
+              <a:buChar char="q"/>
+            </a:pPr>
+            <a:r>
+              <a:rPr lang="en-US" dirty="0"/>
+              <a:t>Medication Management </a:t>
+            </a:r>
+          </a:p>
+          <a:p>
+            <a:pPr marL="285750" indent="-285750">
+              <a:buFont typeface="Wingdings" panose="05000000000000000000" pitchFamily="2" charset="2"/>
+              <a:buChar char="q"/>
+            </a:pPr>
+            <a:r>
+              <a:rPr lang="en-US" dirty="0"/>
+              <a:t>Facility</a:t>
             </a:r>
           </a:p>
         </p:txBody>

</xml_diff>

<commit_message>
Added Indiv view of Resource Slide
</commit_message>
<xml_diff>
--- a/Mock Slides.pptx
+++ b/Mock Slides.pptx
@@ -9,7 +9,8 @@
     <p:sldId id="258" r:id="rId3"/>
     <p:sldId id="259" r:id="rId4"/>
     <p:sldId id="260" r:id="rId5"/>
-    <p:sldId id="261" r:id="rId6"/>
+    <p:sldId id="262" r:id="rId6"/>
+    <p:sldId id="261" r:id="rId7"/>
   </p:sldIdLst>
   <p:sldSz cx="12192000" cy="6858000"/>
   <p:notesSz cx="6858000" cy="9144000"/>
@@ -7070,17 +7071,17 @@
           <a:p>
             <a:r>
               <a:rPr lang="en-US" sz="2400" dirty="0"/>
-              <a:t>Submit a New Resource</a:t>
-            </a:r>
-          </a:p>
-        </p:txBody>
-      </p:sp>
-      <p:sp>
-        <p:nvSpPr>
-          <p:cNvPr id="3" name="Rectangle 2">
-            <a:extLst>
-              <a:ext uri="{FF2B5EF4-FFF2-40B4-BE49-F238E27FC236}">
-                <a16:creationId xmlns:a16="http://schemas.microsoft.com/office/drawing/2014/main" id="{10D42734-9C0E-75DF-3C27-71FC3DDF96B5}"/>
+              <a:t>Therapists</a:t>
+            </a:r>
+          </a:p>
+        </p:txBody>
+      </p:sp>
+      <p:sp>
+        <p:nvSpPr>
+          <p:cNvPr id="8" name="Rectangle 7">
+            <a:extLst>
+              <a:ext uri="{FF2B5EF4-FFF2-40B4-BE49-F238E27FC236}">
+                <a16:creationId xmlns:a16="http://schemas.microsoft.com/office/drawing/2014/main" id="{E51AED90-5109-98B2-6887-C376BA6F4407}"/>
               </a:ext>
             </a:extLst>
           </p:cNvPr>
@@ -7089,8 +7090,8 @@
         </p:nvSpPr>
         <p:spPr>
           <a:xfrm>
-            <a:off x="1034143" y="2460171"/>
-            <a:ext cx="10406743" cy="3788229"/>
+            <a:off x="1208314" y="2513164"/>
+            <a:ext cx="3298372" cy="446315"/>
           </a:xfrm>
           <a:prstGeom prst="rect">
             <a:avLst/>
@@ -7126,10 +7127,10 @@
       </p:sp>
       <p:sp>
         <p:nvSpPr>
-          <p:cNvPr id="5" name="TextBox 4">
-            <a:extLst>
-              <a:ext uri="{FF2B5EF4-FFF2-40B4-BE49-F238E27FC236}">
-                <a16:creationId xmlns:a16="http://schemas.microsoft.com/office/drawing/2014/main" id="{1FB10AA4-B667-CD10-BDFB-974BAA362B07}"/>
+          <p:cNvPr id="9" name="TextBox 8">
+            <a:extLst>
+              <a:ext uri="{FF2B5EF4-FFF2-40B4-BE49-F238E27FC236}">
+                <a16:creationId xmlns:a16="http://schemas.microsoft.com/office/drawing/2014/main" id="{1A92EC61-6962-9B9F-FF73-1B30DE4E4496}"/>
               </a:ext>
             </a:extLst>
           </p:cNvPr>
@@ -7138,13 +7139,15 @@
         </p:nvSpPr>
         <p:spPr>
           <a:xfrm>
-            <a:off x="1148443" y="2575324"/>
-            <a:ext cx="9895114" cy="369332"/>
+            <a:off x="1393370" y="2573679"/>
+            <a:ext cx="2057402" cy="369332"/>
           </a:xfrm>
           <a:prstGeom prst="rect">
             <a:avLst/>
           </a:prstGeom>
-          <a:noFill/>
+          <a:solidFill>
+            <a:schemeClr val="bg1"/>
+          </a:solidFill>
         </p:spPr>
         <p:txBody>
           <a:bodyPr wrap="square" rtlCol="0">
@@ -7154,17 +7157,17 @@
           <a:p>
             <a:r>
               <a:rPr lang="en-US" dirty="0"/>
-              <a:t>What type of resource do you want to submit?</a:t>
-            </a:r>
-          </a:p>
-        </p:txBody>
-      </p:sp>
-      <p:sp>
-        <p:nvSpPr>
-          <p:cNvPr id="7" name="Rectangle 6">
-            <a:extLst>
-              <a:ext uri="{FF2B5EF4-FFF2-40B4-BE49-F238E27FC236}">
-                <a16:creationId xmlns:a16="http://schemas.microsoft.com/office/drawing/2014/main" id="{50153D0C-E696-4DE9-486F-D57DC3390C62}"/>
+              <a:t>Search Resources</a:t>
+            </a:r>
+          </a:p>
+        </p:txBody>
+      </p:sp>
+      <p:sp>
+        <p:nvSpPr>
+          <p:cNvPr id="10" name="Rectangle 9">
+            <a:extLst>
+              <a:ext uri="{FF2B5EF4-FFF2-40B4-BE49-F238E27FC236}">
+                <a16:creationId xmlns:a16="http://schemas.microsoft.com/office/drawing/2014/main" id="{128C5A7E-F465-AE72-3529-8CCB924DA5D5}"/>
               </a:ext>
             </a:extLst>
           </p:cNvPr>
@@ -7173,8 +7176,8 @@
         </p:nvSpPr>
         <p:spPr>
           <a:xfrm>
-            <a:off x="1241329" y="3044728"/>
-            <a:ext cx="3298372" cy="446315"/>
+            <a:off x="1208314" y="3129006"/>
+            <a:ext cx="1556657" cy="2019938"/>
           </a:xfrm>
           <a:prstGeom prst="rect">
             <a:avLst/>
@@ -7204,16 +7207,16 @@
           <a:lstStyle/>
           <a:p>
             <a:pPr algn="ctr"/>
-            <a:endParaRPr lang="en-US" dirty="0"/>
-          </a:p>
-        </p:txBody>
-      </p:sp>
-      <p:sp>
-        <p:nvSpPr>
-          <p:cNvPr id="8" name="TextBox 7">
-            <a:extLst>
-              <a:ext uri="{FF2B5EF4-FFF2-40B4-BE49-F238E27FC236}">
-                <a16:creationId xmlns:a16="http://schemas.microsoft.com/office/drawing/2014/main" id="{C1B478F8-D918-4974-83B7-494472637168}"/>
+            <a:endParaRPr lang="en-US"/>
+          </a:p>
+        </p:txBody>
+      </p:sp>
+      <p:sp>
+        <p:nvSpPr>
+          <p:cNvPr id="11" name="TextBox 10">
+            <a:extLst>
+              <a:ext uri="{FF2B5EF4-FFF2-40B4-BE49-F238E27FC236}">
+                <a16:creationId xmlns:a16="http://schemas.microsoft.com/office/drawing/2014/main" id="{5EC0B1F4-163E-C389-3E6D-F21D487F26E7}"/>
               </a:ext>
             </a:extLst>
           </p:cNvPr>
@@ -7222,8 +7225,8 @@
         </p:nvSpPr>
         <p:spPr>
           <a:xfrm>
-            <a:off x="1306744" y="3091883"/>
-            <a:ext cx="2057402" cy="369332"/>
+            <a:off x="1208314" y="3234502"/>
+            <a:ext cx="1556657" cy="2031325"/>
           </a:xfrm>
           <a:prstGeom prst="rect">
             <a:avLst/>
@@ -7240,17 +7243,57 @@
           <a:p>
             <a:r>
               <a:rPr lang="en-US" dirty="0"/>
-              <a:t>Search Resources</a:t>
-            </a:r>
-          </a:p>
-        </p:txBody>
-      </p:sp>
-      <p:sp>
-        <p:nvSpPr>
-          <p:cNvPr id="11" name="Rectangle 10">
-            <a:extLst>
-              <a:ext uri="{FF2B5EF4-FFF2-40B4-BE49-F238E27FC236}">
-                <a16:creationId xmlns:a16="http://schemas.microsoft.com/office/drawing/2014/main" id="{4A325397-ED75-0FAE-C493-4EFB0726B218}"/>
+              <a:t>Filter</a:t>
+            </a:r>
+          </a:p>
+          <a:p>
+            <a:pPr marL="285750" indent="-285750">
+              <a:buFont typeface="Wingdings" panose="05000000000000000000" pitchFamily="2" charset="2"/>
+              <a:buChar char="q"/>
+            </a:pPr>
+            <a:r>
+              <a:rPr lang="en-US" dirty="0"/>
+              <a:t>Med MGMT</a:t>
+            </a:r>
+          </a:p>
+          <a:p>
+            <a:pPr marL="285750" indent="-285750">
+              <a:buFont typeface="Wingdings" panose="05000000000000000000" pitchFamily="2" charset="2"/>
+              <a:buChar char="q"/>
+            </a:pPr>
+            <a:r>
+              <a:rPr lang="en-US" dirty="0"/>
+              <a:t>Therapists</a:t>
+            </a:r>
+          </a:p>
+          <a:p>
+            <a:pPr marL="285750" indent="-285750">
+              <a:buFont typeface="Wingdings" panose="05000000000000000000" pitchFamily="2" charset="2"/>
+              <a:buChar char="q"/>
+            </a:pPr>
+            <a:r>
+              <a:rPr lang="en-US" dirty="0"/>
+              <a:t>Facilities </a:t>
+            </a:r>
+          </a:p>
+          <a:p>
+            <a:pPr marL="285750" indent="-285750">
+              <a:buFont typeface="Wingdings" panose="05000000000000000000" pitchFamily="2" charset="2"/>
+              <a:buChar char="q"/>
+            </a:pPr>
+            <a:r>
+              <a:rPr lang="en-US" dirty="0"/>
+              <a:t>Student Resources</a:t>
+            </a:r>
+          </a:p>
+        </p:txBody>
+      </p:sp>
+      <p:sp>
+        <p:nvSpPr>
+          <p:cNvPr id="12" name="Rectangle 11">
+            <a:extLst>
+              <a:ext uri="{FF2B5EF4-FFF2-40B4-BE49-F238E27FC236}">
+                <a16:creationId xmlns:a16="http://schemas.microsoft.com/office/drawing/2014/main" id="{485F5B08-8432-2BE9-36DF-C87FB4CFA3EF}"/>
               </a:ext>
             </a:extLst>
           </p:cNvPr>
@@ -7259,12 +7302,15 @@
         </p:nvSpPr>
         <p:spPr>
           <a:xfrm>
-            <a:off x="3571332" y="3118032"/>
-            <a:ext cx="883299" cy="285822"/>
+            <a:off x="3124201" y="3150992"/>
+            <a:ext cx="7859485" cy="3060503"/>
           </a:xfrm>
           <a:prstGeom prst="rect">
             <a:avLst/>
           </a:prstGeom>
+          <a:solidFill>
+            <a:schemeClr val="bg1"/>
+          </a:solidFill>
         </p:spPr>
         <p:style>
           <a:lnRef idx="2">
@@ -7287,16 +7333,16 @@
           <a:lstStyle/>
           <a:p>
             <a:pPr algn="ctr"/>
-            <a:endParaRPr lang="en-US"/>
-          </a:p>
-        </p:txBody>
-      </p:sp>
-      <p:sp>
-        <p:nvSpPr>
-          <p:cNvPr id="10" name="TextBox 9">
-            <a:extLst>
-              <a:ext uri="{FF2B5EF4-FFF2-40B4-BE49-F238E27FC236}">
-                <a16:creationId xmlns:a16="http://schemas.microsoft.com/office/drawing/2014/main" id="{3285B259-8C35-EFE1-42AD-47FF24C4C84E}"/>
+            <a:endParaRPr lang="en-US" dirty="0"/>
+          </a:p>
+        </p:txBody>
+      </p:sp>
+      <p:sp>
+        <p:nvSpPr>
+          <p:cNvPr id="20" name="TextBox 19">
+            <a:extLst>
+              <a:ext uri="{FF2B5EF4-FFF2-40B4-BE49-F238E27FC236}">
+                <a16:creationId xmlns:a16="http://schemas.microsoft.com/office/drawing/2014/main" id="{46403084-8C94-AC1A-F74E-01EDD65EBEB3}"/>
               </a:ext>
             </a:extLst>
           </p:cNvPr>
@@ -7305,86 +7351,8 @@
         </p:nvSpPr>
         <p:spPr>
           <a:xfrm>
-            <a:off x="3597169" y="3076277"/>
-            <a:ext cx="942532" cy="369332"/>
-          </a:xfrm>
-          <a:prstGeom prst="rect">
-            <a:avLst/>
-          </a:prstGeom>
-          <a:noFill/>
-        </p:spPr>
-        <p:txBody>
-          <a:bodyPr wrap="square" rtlCol="0">
-            <a:spAutoFit/>
-          </a:bodyPr>
-          <a:lstStyle/>
-          <a:p>
-            <a:r>
-              <a:rPr lang="en-US" dirty="0">
-                <a:solidFill>
-                  <a:schemeClr val="bg1"/>
-                </a:solidFill>
-              </a:rPr>
-              <a:t>Search</a:t>
-            </a:r>
-          </a:p>
-        </p:txBody>
-      </p:sp>
-      <p:sp>
-        <p:nvSpPr>
-          <p:cNvPr id="14" name="TextBox 13">
-            <a:extLst>
-              <a:ext uri="{FF2B5EF4-FFF2-40B4-BE49-F238E27FC236}">
-                <a16:creationId xmlns:a16="http://schemas.microsoft.com/office/drawing/2014/main" id="{05C40C7D-BCF5-0DD3-E3D1-DCFE195D975F}"/>
-              </a:ext>
-            </a:extLst>
-          </p:cNvPr>
-          <p:cNvSpPr txBox="1"/>
-          <p:nvPr/>
-        </p:nvSpPr>
-        <p:spPr>
-          <a:xfrm>
-            <a:off x="2306828" y="3577010"/>
-            <a:ext cx="961271" cy="369332"/>
-          </a:xfrm>
-          <a:prstGeom prst="rect">
-            <a:avLst/>
-          </a:prstGeom>
-          <a:noFill/>
-        </p:spPr>
-        <p:txBody>
-          <a:bodyPr wrap="square" rtlCol="0">
-            <a:spAutoFit/>
-          </a:bodyPr>
-          <a:lstStyle/>
-          <a:p>
-            <a:r>
-              <a:rPr lang="en-US" dirty="0">
-                <a:solidFill>
-                  <a:schemeClr val="bg1"/>
-                </a:solidFill>
-              </a:rPr>
-              <a:t>Search</a:t>
-            </a:r>
-          </a:p>
-        </p:txBody>
-      </p:sp>
-      <p:sp>
-        <p:nvSpPr>
-          <p:cNvPr id="16" name="Rectangle 15">
-            <a:extLst>
-              <a:ext uri="{FF2B5EF4-FFF2-40B4-BE49-F238E27FC236}">
-                <a16:creationId xmlns:a16="http://schemas.microsoft.com/office/drawing/2014/main" id="{4A5D7CC8-E940-DC9A-A5AF-051BCA4C0A3C}"/>
-              </a:ext>
-            </a:extLst>
-          </p:cNvPr>
-          <p:cNvSpPr/>
-          <p:nvPr/>
-        </p:nvSpPr>
-        <p:spPr>
-          <a:xfrm>
-            <a:off x="1241329" y="3577010"/>
-            <a:ext cx="4922190" cy="2499699"/>
+            <a:off x="1208314" y="5440435"/>
+            <a:ext cx="1600200" cy="646331"/>
           </a:xfrm>
           <a:prstGeom prst="rect">
             <a:avLst/>
@@ -7392,6 +7360,51 @@
           <a:solidFill>
             <a:schemeClr val="bg1"/>
           </a:solidFill>
+          <a:ln w="19050">
+            <a:solidFill>
+              <a:schemeClr val="tx1"/>
+            </a:solidFill>
+          </a:ln>
+        </p:spPr>
+        <p:txBody>
+          <a:bodyPr wrap="square" rtlCol="0">
+            <a:spAutoFit/>
+          </a:bodyPr>
+          <a:lstStyle/>
+          <a:p>
+            <a:r>
+              <a:rPr lang="en-US" dirty="0"/>
+              <a:t>Submit New</a:t>
+            </a:r>
+          </a:p>
+          <a:p>
+            <a:r>
+              <a:rPr lang="en-US" dirty="0"/>
+              <a:t>Resource </a:t>
+            </a:r>
+          </a:p>
+        </p:txBody>
+      </p:sp>
+      <p:sp>
+        <p:nvSpPr>
+          <p:cNvPr id="5" name="Rectangle 4">
+            <a:extLst>
+              <a:ext uri="{FF2B5EF4-FFF2-40B4-BE49-F238E27FC236}">
+                <a16:creationId xmlns:a16="http://schemas.microsoft.com/office/drawing/2014/main" id="{2CE0AA1F-588F-715A-0DE9-8A9A49FA4DD3}"/>
+              </a:ext>
+            </a:extLst>
+          </p:cNvPr>
+          <p:cNvSpPr/>
+          <p:nvPr/>
+        </p:nvSpPr>
+        <p:spPr>
+          <a:xfrm>
+            <a:off x="3522446" y="2595548"/>
+            <a:ext cx="883299" cy="285822"/>
+          </a:xfrm>
+          <a:prstGeom prst="rect">
+            <a:avLst/>
+          </a:prstGeom>
         </p:spPr>
         <p:style>
           <a:lnRef idx="2">
@@ -7420,10 +7433,10 @@
       </p:sp>
       <p:sp>
         <p:nvSpPr>
-          <p:cNvPr id="17" name="TextBox 16">
-            <a:extLst>
-              <a:ext uri="{FF2B5EF4-FFF2-40B4-BE49-F238E27FC236}">
-                <a16:creationId xmlns:a16="http://schemas.microsoft.com/office/drawing/2014/main" id="{74610DF2-1102-D3FC-194F-3D05B1A47ED9}"/>
+          <p:cNvPr id="7" name="TextBox 6">
+            <a:extLst>
+              <a:ext uri="{FF2B5EF4-FFF2-40B4-BE49-F238E27FC236}">
+                <a16:creationId xmlns:a16="http://schemas.microsoft.com/office/drawing/2014/main" id="{2F84E5DD-2891-2111-651C-E20EA89B6B71}"/>
               </a:ext>
             </a:extLst>
           </p:cNvPr>
@@ -7432,8 +7445,8 @@
         </p:nvSpPr>
         <p:spPr>
           <a:xfrm>
-            <a:off x="1377387" y="3704368"/>
-            <a:ext cx="4718613" cy="923330"/>
+            <a:off x="3564154" y="2565680"/>
+            <a:ext cx="942532" cy="369332"/>
           </a:xfrm>
           <a:prstGeom prst="rect">
             <a:avLst/>
@@ -7446,6 +7459,820 @@
           </a:bodyPr>
           <a:lstStyle/>
           <a:p>
+            <a:r>
+              <a:rPr lang="en-US" dirty="0">
+                <a:solidFill>
+                  <a:schemeClr val="bg1"/>
+                </a:solidFill>
+              </a:rPr>
+              <a:t>Search</a:t>
+            </a:r>
+          </a:p>
+        </p:txBody>
+      </p:sp>
+      <p:pic>
+        <p:nvPicPr>
+          <p:cNvPr id="17" name="Picture 16" descr="A black check mark on a white background&#10;&#10;Description automatically generated">
+            <a:extLst>
+              <a:ext uri="{FF2B5EF4-FFF2-40B4-BE49-F238E27FC236}">
+                <a16:creationId xmlns:a16="http://schemas.microsoft.com/office/drawing/2014/main" id="{3BB524BE-9707-224F-AC6D-BBB30E256924}"/>
+              </a:ext>
+            </a:extLst>
+          </p:cNvPr>
+          <p:cNvPicPr>
+            <a:picLocks noChangeAspect="1"/>
+          </p:cNvPicPr>
+          <p:nvPr/>
+        </p:nvPicPr>
+        <p:blipFill>
+          <a:blip r:embed="rId4">
+            <a:extLst>
+              <a:ext uri="{28A0092B-C50C-407E-A947-70E740481C1C}">
+                <a14:useLocalDpi xmlns:a14="http://schemas.microsoft.com/office/drawing/2010/main" val="0"/>
+              </a:ext>
+              <a:ext uri="{837473B0-CC2E-450A-ABE3-18F120FF3D39}">
+                <a1611:picAttrSrcUrl xmlns:a1611="http://schemas.microsoft.com/office/drawing/2016/11/main" r:id="rId5"/>
+              </a:ext>
+            </a:extLst>
+          </a:blip>
+          <a:stretch>
+            <a:fillRect/>
+          </a:stretch>
+        </p:blipFill>
+        <p:spPr>
+          <a:xfrm>
+            <a:off x="1316396" y="4103894"/>
+            <a:ext cx="162046" cy="162046"/>
+          </a:xfrm>
+          <a:prstGeom prst="rect">
+            <a:avLst/>
+          </a:prstGeom>
+        </p:spPr>
+      </p:pic>
+      <p:sp>
+        <p:nvSpPr>
+          <p:cNvPr id="22" name="TextBox 21">
+            <a:extLst>
+              <a:ext uri="{FF2B5EF4-FFF2-40B4-BE49-F238E27FC236}">
+                <a16:creationId xmlns:a16="http://schemas.microsoft.com/office/drawing/2014/main" id="{1EC668A4-01E2-AF7E-8A0A-DFF4D4918D8F}"/>
+              </a:ext>
+            </a:extLst>
+          </p:cNvPr>
+          <p:cNvSpPr txBox="1"/>
+          <p:nvPr/>
+        </p:nvSpPr>
+        <p:spPr>
+          <a:xfrm>
+            <a:off x="5275519" y="3312536"/>
+            <a:ext cx="5604134" cy="3031599"/>
+          </a:xfrm>
+          <a:prstGeom prst="rect">
+            <a:avLst/>
+          </a:prstGeom>
+          <a:noFill/>
+        </p:spPr>
+        <p:txBody>
+          <a:bodyPr wrap="square" rtlCol="0">
+            <a:spAutoFit/>
+          </a:bodyPr>
+          <a:lstStyle/>
+          <a:p>
+            <a:r>
+              <a:rPr lang="en-US" sz="2000" b="1" dirty="0"/>
+              <a:t>Janine Hinkley</a:t>
+            </a:r>
+          </a:p>
+          <a:p>
+            <a:r>
+              <a:rPr lang="en-US" sz="1500" dirty="0"/>
+              <a:t>Licensed Professional Counselor </a:t>
+            </a:r>
+          </a:p>
+          <a:p>
+            <a:r>
+              <a:rPr lang="en-US" sz="1500" b="1" dirty="0"/>
+              <a:t> </a:t>
+            </a:r>
+          </a:p>
+          <a:p>
+            <a:r>
+              <a:rPr lang="en-US" sz="1500" dirty="0"/>
+              <a:t>Associated Practice: Sunny Paths LLC. </a:t>
+            </a:r>
+          </a:p>
+          <a:p>
+            <a:r>
+              <a:rPr lang="en-US" sz="1500" dirty="0"/>
+              <a:t>123 Mockingbird Lane, Johnson City, Tennessee</a:t>
+            </a:r>
+          </a:p>
+          <a:p>
+            <a:endParaRPr lang="en-US" sz="1500" dirty="0"/>
+          </a:p>
+          <a:p>
+            <a:r>
+              <a:rPr lang="en-US" sz="1500" dirty="0"/>
+              <a:t>Accepts Insurance: Yes</a:t>
+            </a:r>
+          </a:p>
+          <a:p>
+            <a:r>
+              <a:rPr lang="en-US" sz="1500" dirty="0"/>
+              <a:t>Insurances Accepted: Cigna, Aetna, BlueCross BlueShield</a:t>
+            </a:r>
+          </a:p>
+          <a:p>
+            <a:endParaRPr lang="en-US" sz="1500" dirty="0"/>
+          </a:p>
+          <a:p>
+            <a:r>
+              <a:rPr lang="en-US" sz="1500" dirty="0"/>
+              <a:t>Phone: 555-555-5555</a:t>
+            </a:r>
+          </a:p>
+          <a:p>
+            <a:r>
+              <a:rPr lang="en-US" dirty="0"/>
+              <a:t> </a:t>
+            </a:r>
+          </a:p>
+          <a:p>
+            <a:r>
+              <a:rPr lang="en-US" dirty="0"/>
+              <a:t>	</a:t>
+            </a:r>
+          </a:p>
+        </p:txBody>
+      </p:sp>
+      <p:pic>
+        <p:nvPicPr>
+          <p:cNvPr id="24" name="Picture 23" descr="A close-up of a person smiling&#10;&#10;Description automatically generated">
+            <a:extLst>
+              <a:ext uri="{FF2B5EF4-FFF2-40B4-BE49-F238E27FC236}">
+                <a16:creationId xmlns:a16="http://schemas.microsoft.com/office/drawing/2014/main" id="{3D3AC603-028B-8D69-5EA2-F4697DA4A1E1}"/>
+              </a:ext>
+            </a:extLst>
+          </p:cNvPr>
+          <p:cNvPicPr>
+            <a:picLocks noChangeAspect="1"/>
+          </p:cNvPicPr>
+          <p:nvPr/>
+        </p:nvPicPr>
+        <p:blipFill>
+          <a:blip r:embed="rId6">
+            <a:extLst>
+              <a:ext uri="{28A0092B-C50C-407E-A947-70E740481C1C}">
+                <a14:useLocalDpi xmlns:a14="http://schemas.microsoft.com/office/drawing/2010/main" val="0"/>
+              </a:ext>
+              <a:ext uri="{837473B0-CC2E-450A-ABE3-18F120FF3D39}">
+                <a1611:picAttrSrcUrl xmlns:a1611="http://schemas.microsoft.com/office/drawing/2016/11/main" r:id="rId7"/>
+              </a:ext>
+            </a:extLst>
+          </a:blip>
+          <a:stretch>
+            <a:fillRect/>
+          </a:stretch>
+        </p:blipFill>
+        <p:spPr>
+          <a:xfrm>
+            <a:off x="3338623" y="3312536"/>
+            <a:ext cx="1722475" cy="1986588"/>
+          </a:xfrm>
+          <a:prstGeom prst="rect">
+            <a:avLst/>
+          </a:prstGeom>
+        </p:spPr>
+      </p:pic>
+      <p:sp>
+        <p:nvSpPr>
+          <p:cNvPr id="25" name="Rectangle 24">
+            <a:extLst>
+              <a:ext uri="{FF2B5EF4-FFF2-40B4-BE49-F238E27FC236}">
+                <a16:creationId xmlns:a16="http://schemas.microsoft.com/office/drawing/2014/main" id="{3CF345C9-64F9-5C98-D631-D75E57878B29}"/>
+              </a:ext>
+            </a:extLst>
+          </p:cNvPr>
+          <p:cNvSpPr/>
+          <p:nvPr/>
+        </p:nvSpPr>
+        <p:spPr>
+          <a:xfrm>
+            <a:off x="9293109" y="2530612"/>
+            <a:ext cx="1690577" cy="477139"/>
+          </a:xfrm>
+          <a:prstGeom prst="rect">
+            <a:avLst/>
+          </a:prstGeom>
+          <a:solidFill>
+            <a:schemeClr val="bg1"/>
+          </a:solidFill>
+        </p:spPr>
+        <p:style>
+          <a:lnRef idx="2">
+            <a:schemeClr val="accent1">
+              <a:shade val="15000"/>
+            </a:schemeClr>
+          </a:lnRef>
+          <a:fillRef idx="1">
+            <a:schemeClr val="accent1"/>
+          </a:fillRef>
+          <a:effectRef idx="0">
+            <a:schemeClr val="accent1"/>
+          </a:effectRef>
+          <a:fontRef idx="minor">
+            <a:schemeClr val="lt1"/>
+          </a:fontRef>
+        </p:style>
+        <p:txBody>
+          <a:bodyPr rtlCol="0" anchor="ctr"/>
+          <a:lstStyle/>
+          <a:p>
+            <a:pPr algn="ctr"/>
+            <a:endParaRPr lang="en-US" dirty="0"/>
+          </a:p>
+        </p:txBody>
+      </p:sp>
+      <p:sp>
+        <p:nvSpPr>
+          <p:cNvPr id="26" name="TextBox 25">
+            <a:extLst>
+              <a:ext uri="{FF2B5EF4-FFF2-40B4-BE49-F238E27FC236}">
+                <a16:creationId xmlns:a16="http://schemas.microsoft.com/office/drawing/2014/main" id="{19B79D01-0014-2456-F8FA-FFE1B95B555A}"/>
+              </a:ext>
+            </a:extLst>
+          </p:cNvPr>
+          <p:cNvSpPr txBox="1"/>
+          <p:nvPr/>
+        </p:nvSpPr>
+        <p:spPr>
+          <a:xfrm>
+            <a:off x="9293109" y="2596148"/>
+            <a:ext cx="1764260" cy="369332"/>
+          </a:xfrm>
+          <a:prstGeom prst="rect">
+            <a:avLst/>
+          </a:prstGeom>
+          <a:noFill/>
+        </p:spPr>
+        <p:txBody>
+          <a:bodyPr wrap="square" rtlCol="0">
+            <a:spAutoFit/>
+          </a:bodyPr>
+          <a:lstStyle/>
+          <a:p>
+            <a:r>
+              <a:rPr lang="en-US" dirty="0"/>
+              <a:t>Back to Search</a:t>
+            </a:r>
+          </a:p>
+        </p:txBody>
+      </p:sp>
+    </p:spTree>
+    <p:extLst>
+      <p:ext uri="{BB962C8B-B14F-4D97-AF65-F5344CB8AC3E}">
+        <p14:creationId xmlns:p14="http://schemas.microsoft.com/office/powerpoint/2010/main" val="4019497802"/>
+      </p:ext>
+    </p:extLst>
+  </p:cSld>
+  <p:clrMapOvr>
+    <a:masterClrMapping/>
+  </p:clrMapOvr>
+</p:sld>
+</file>
+
+<file path=ppt/slides/slide6.xml><?xml version="1.0" encoding="utf-8"?>
+<p:sld xmlns:a="http://schemas.openxmlformats.org/drawingml/2006/main" xmlns:r="http://schemas.openxmlformats.org/officeDocument/2006/relationships" xmlns:p="http://schemas.openxmlformats.org/presentationml/2006/main">
+  <p:cSld>
+    <p:bg>
+      <p:bgPr>
+        <a:blipFill dpi="0" rotWithShape="1">
+          <a:blip r:embed="rId2">
+            <a:lum/>
+            <a:extLst>
+              <a:ext uri="{837473B0-CC2E-450A-ABE3-18F120FF3D39}">
+                <a1611:picAttrSrcUrl xmlns:a1611="http://schemas.microsoft.com/office/drawing/2016/11/main" r:id="rId3"/>
+              </a:ext>
+            </a:extLst>
+          </a:blip>
+          <a:srcRect/>
+          <a:stretch>
+            <a:fillRect t="-6000" b="-6000"/>
+          </a:stretch>
+        </a:blipFill>
+        <a:effectLst/>
+      </p:bgPr>
+    </p:bg>
+    <p:spTree>
+      <p:nvGrpSpPr>
+        <p:cNvPr id="1" name=""/>
+        <p:cNvGrpSpPr/>
+        <p:nvPr/>
+      </p:nvGrpSpPr>
+      <p:grpSpPr>
+        <a:xfrm>
+          <a:off x="0" y="0"/>
+          <a:ext cx="0" cy="0"/>
+          <a:chOff x="0" y="0"/>
+          <a:chExt cx="0" cy="0"/>
+        </a:xfrm>
+      </p:grpSpPr>
+      <p:sp>
+        <p:nvSpPr>
+          <p:cNvPr id="2" name="Title 1">
+            <a:extLst>
+              <a:ext uri="{FF2B5EF4-FFF2-40B4-BE49-F238E27FC236}">
+                <a16:creationId xmlns:a16="http://schemas.microsoft.com/office/drawing/2014/main" id="{9F8FC6F8-2B1B-109C-0702-1B540C8E549A}"/>
+              </a:ext>
+            </a:extLst>
+          </p:cNvPr>
+          <p:cNvSpPr>
+            <a:spLocks noGrp="1"/>
+          </p:cNvSpPr>
+          <p:nvPr>
+            <p:ph type="title"/>
+          </p:nvPr>
+        </p:nvSpPr>
+        <p:spPr>
+          <a:xfrm>
+            <a:off x="751114" y="243160"/>
+            <a:ext cx="10515600" cy="1325563"/>
+          </a:xfrm>
+        </p:spPr>
+        <p:txBody>
+          <a:bodyPr/>
+          <a:lstStyle/>
+          <a:p>
+            <a:r>
+              <a:rPr lang="en-US" dirty="0"/>
+              <a:t>East Tennessee Mental Health Resources </a:t>
+            </a:r>
+          </a:p>
+        </p:txBody>
+      </p:sp>
+      <p:sp>
+        <p:nvSpPr>
+          <p:cNvPr id="4" name="Rectangle 3">
+            <a:extLst>
+              <a:ext uri="{FF2B5EF4-FFF2-40B4-BE49-F238E27FC236}">
+                <a16:creationId xmlns:a16="http://schemas.microsoft.com/office/drawing/2014/main" id="{BDD66A68-8711-09F8-190D-10839F9700DE}"/>
+              </a:ext>
+            </a:extLst>
+          </p:cNvPr>
+          <p:cNvSpPr/>
+          <p:nvPr/>
+        </p:nvSpPr>
+        <p:spPr>
+          <a:xfrm>
+            <a:off x="751114" y="2201412"/>
+            <a:ext cx="10929257" cy="4299856"/>
+          </a:xfrm>
+          <a:prstGeom prst="rect">
+            <a:avLst/>
+          </a:prstGeom>
+          <a:solidFill>
+            <a:schemeClr val="bg1">
+              <a:lumMod val="85000"/>
+            </a:schemeClr>
+          </a:solidFill>
+          <a:ln>
+            <a:solidFill>
+              <a:schemeClr val="bg1">
+                <a:lumMod val="85000"/>
+              </a:schemeClr>
+            </a:solidFill>
+          </a:ln>
+        </p:spPr>
+        <p:style>
+          <a:lnRef idx="2">
+            <a:schemeClr val="accent1">
+              <a:shade val="15000"/>
+            </a:schemeClr>
+          </a:lnRef>
+          <a:fillRef idx="1">
+            <a:schemeClr val="accent1"/>
+          </a:fillRef>
+          <a:effectRef idx="0">
+            <a:schemeClr val="accent1"/>
+          </a:effectRef>
+          <a:fontRef idx="minor">
+            <a:schemeClr val="lt1"/>
+          </a:fontRef>
+        </p:style>
+        <p:txBody>
+          <a:bodyPr rtlCol="0" anchor="ctr"/>
+          <a:lstStyle/>
+          <a:p>
+            <a:pPr algn="ctr"/>
+            <a:endParaRPr lang="en-US" dirty="0"/>
+          </a:p>
+        </p:txBody>
+      </p:sp>
+      <p:sp>
+        <p:nvSpPr>
+          <p:cNvPr id="6" name="TextBox 5">
+            <a:extLst>
+              <a:ext uri="{FF2B5EF4-FFF2-40B4-BE49-F238E27FC236}">
+                <a16:creationId xmlns:a16="http://schemas.microsoft.com/office/drawing/2014/main" id="{C08A4A4B-ECA8-DD96-7405-99351A505CB8}"/>
+              </a:ext>
+            </a:extLst>
+          </p:cNvPr>
+          <p:cNvSpPr txBox="1"/>
+          <p:nvPr/>
+        </p:nvSpPr>
+        <p:spPr>
+          <a:xfrm>
+            <a:off x="838201" y="1448256"/>
+            <a:ext cx="9361714" cy="461665"/>
+          </a:xfrm>
+          <a:prstGeom prst="rect">
+            <a:avLst/>
+          </a:prstGeom>
+          <a:noFill/>
+        </p:spPr>
+        <p:txBody>
+          <a:bodyPr wrap="square" rtlCol="0">
+            <a:spAutoFit/>
+          </a:bodyPr>
+          <a:lstStyle/>
+          <a:p>
+            <a:r>
+              <a:rPr lang="en-US" sz="2400" dirty="0"/>
+              <a:t>Submit a New Resource</a:t>
+            </a:r>
+          </a:p>
+        </p:txBody>
+      </p:sp>
+      <p:sp>
+        <p:nvSpPr>
+          <p:cNvPr id="3" name="Rectangle 2">
+            <a:extLst>
+              <a:ext uri="{FF2B5EF4-FFF2-40B4-BE49-F238E27FC236}">
+                <a16:creationId xmlns:a16="http://schemas.microsoft.com/office/drawing/2014/main" id="{10D42734-9C0E-75DF-3C27-71FC3DDF96B5}"/>
+              </a:ext>
+            </a:extLst>
+          </p:cNvPr>
+          <p:cNvSpPr/>
+          <p:nvPr/>
+        </p:nvSpPr>
+        <p:spPr>
+          <a:xfrm>
+            <a:off x="1034143" y="2460171"/>
+            <a:ext cx="10406743" cy="3788229"/>
+          </a:xfrm>
+          <a:prstGeom prst="rect">
+            <a:avLst/>
+          </a:prstGeom>
+          <a:solidFill>
+            <a:schemeClr val="bg1"/>
+          </a:solidFill>
+        </p:spPr>
+        <p:style>
+          <a:lnRef idx="2">
+            <a:schemeClr val="accent1">
+              <a:shade val="15000"/>
+            </a:schemeClr>
+          </a:lnRef>
+          <a:fillRef idx="1">
+            <a:schemeClr val="accent1"/>
+          </a:fillRef>
+          <a:effectRef idx="0">
+            <a:schemeClr val="accent1"/>
+          </a:effectRef>
+          <a:fontRef idx="minor">
+            <a:schemeClr val="lt1"/>
+          </a:fontRef>
+        </p:style>
+        <p:txBody>
+          <a:bodyPr rtlCol="0" anchor="ctr"/>
+          <a:lstStyle/>
+          <a:p>
+            <a:pPr algn="ctr"/>
+            <a:endParaRPr lang="en-US" dirty="0"/>
+          </a:p>
+        </p:txBody>
+      </p:sp>
+      <p:sp>
+        <p:nvSpPr>
+          <p:cNvPr id="5" name="TextBox 4">
+            <a:extLst>
+              <a:ext uri="{FF2B5EF4-FFF2-40B4-BE49-F238E27FC236}">
+                <a16:creationId xmlns:a16="http://schemas.microsoft.com/office/drawing/2014/main" id="{1FB10AA4-B667-CD10-BDFB-974BAA362B07}"/>
+              </a:ext>
+            </a:extLst>
+          </p:cNvPr>
+          <p:cNvSpPr txBox="1"/>
+          <p:nvPr/>
+        </p:nvSpPr>
+        <p:spPr>
+          <a:xfrm>
+            <a:off x="1148443" y="2575324"/>
+            <a:ext cx="9895114" cy="369332"/>
+          </a:xfrm>
+          <a:prstGeom prst="rect">
+            <a:avLst/>
+          </a:prstGeom>
+          <a:noFill/>
+        </p:spPr>
+        <p:txBody>
+          <a:bodyPr wrap="square" rtlCol="0">
+            <a:spAutoFit/>
+          </a:bodyPr>
+          <a:lstStyle/>
+          <a:p>
+            <a:r>
+              <a:rPr lang="en-US" dirty="0"/>
+              <a:t>What type of resource do you want to submit?</a:t>
+            </a:r>
+          </a:p>
+        </p:txBody>
+      </p:sp>
+      <p:sp>
+        <p:nvSpPr>
+          <p:cNvPr id="7" name="Rectangle 6">
+            <a:extLst>
+              <a:ext uri="{FF2B5EF4-FFF2-40B4-BE49-F238E27FC236}">
+                <a16:creationId xmlns:a16="http://schemas.microsoft.com/office/drawing/2014/main" id="{50153D0C-E696-4DE9-486F-D57DC3390C62}"/>
+              </a:ext>
+            </a:extLst>
+          </p:cNvPr>
+          <p:cNvSpPr/>
+          <p:nvPr/>
+        </p:nvSpPr>
+        <p:spPr>
+          <a:xfrm>
+            <a:off x="1241329" y="3044728"/>
+            <a:ext cx="3298372" cy="446315"/>
+          </a:xfrm>
+          <a:prstGeom prst="rect">
+            <a:avLst/>
+          </a:prstGeom>
+          <a:solidFill>
+            <a:schemeClr val="bg1"/>
+          </a:solidFill>
+        </p:spPr>
+        <p:style>
+          <a:lnRef idx="2">
+            <a:schemeClr val="accent1">
+              <a:shade val="15000"/>
+            </a:schemeClr>
+          </a:lnRef>
+          <a:fillRef idx="1">
+            <a:schemeClr val="accent1"/>
+          </a:fillRef>
+          <a:effectRef idx="0">
+            <a:schemeClr val="accent1"/>
+          </a:effectRef>
+          <a:fontRef idx="minor">
+            <a:schemeClr val="lt1"/>
+          </a:fontRef>
+        </p:style>
+        <p:txBody>
+          <a:bodyPr rtlCol="0" anchor="ctr"/>
+          <a:lstStyle/>
+          <a:p>
+            <a:pPr algn="ctr"/>
+            <a:endParaRPr lang="en-US" dirty="0"/>
+          </a:p>
+        </p:txBody>
+      </p:sp>
+      <p:sp>
+        <p:nvSpPr>
+          <p:cNvPr id="8" name="TextBox 7">
+            <a:extLst>
+              <a:ext uri="{FF2B5EF4-FFF2-40B4-BE49-F238E27FC236}">
+                <a16:creationId xmlns:a16="http://schemas.microsoft.com/office/drawing/2014/main" id="{C1B478F8-D918-4974-83B7-494472637168}"/>
+              </a:ext>
+            </a:extLst>
+          </p:cNvPr>
+          <p:cNvSpPr txBox="1"/>
+          <p:nvPr/>
+        </p:nvSpPr>
+        <p:spPr>
+          <a:xfrm>
+            <a:off x="1306744" y="3091883"/>
+            <a:ext cx="2057402" cy="369332"/>
+          </a:xfrm>
+          <a:prstGeom prst="rect">
+            <a:avLst/>
+          </a:prstGeom>
+          <a:solidFill>
+            <a:schemeClr val="bg1"/>
+          </a:solidFill>
+        </p:spPr>
+        <p:txBody>
+          <a:bodyPr wrap="square" rtlCol="0">
+            <a:spAutoFit/>
+          </a:bodyPr>
+          <a:lstStyle/>
+          <a:p>
+            <a:r>
+              <a:rPr lang="en-US" dirty="0"/>
+              <a:t>Search Resources</a:t>
+            </a:r>
+          </a:p>
+        </p:txBody>
+      </p:sp>
+      <p:sp>
+        <p:nvSpPr>
+          <p:cNvPr id="11" name="Rectangle 10">
+            <a:extLst>
+              <a:ext uri="{FF2B5EF4-FFF2-40B4-BE49-F238E27FC236}">
+                <a16:creationId xmlns:a16="http://schemas.microsoft.com/office/drawing/2014/main" id="{4A325397-ED75-0FAE-C493-4EFB0726B218}"/>
+              </a:ext>
+            </a:extLst>
+          </p:cNvPr>
+          <p:cNvSpPr/>
+          <p:nvPr/>
+        </p:nvSpPr>
+        <p:spPr>
+          <a:xfrm>
+            <a:off x="3571332" y="3118032"/>
+            <a:ext cx="883299" cy="285822"/>
+          </a:xfrm>
+          <a:prstGeom prst="rect">
+            <a:avLst/>
+          </a:prstGeom>
+        </p:spPr>
+        <p:style>
+          <a:lnRef idx="2">
+            <a:schemeClr val="accent1">
+              <a:shade val="15000"/>
+            </a:schemeClr>
+          </a:lnRef>
+          <a:fillRef idx="1">
+            <a:schemeClr val="accent1"/>
+          </a:fillRef>
+          <a:effectRef idx="0">
+            <a:schemeClr val="accent1"/>
+          </a:effectRef>
+          <a:fontRef idx="minor">
+            <a:schemeClr val="lt1"/>
+          </a:fontRef>
+        </p:style>
+        <p:txBody>
+          <a:bodyPr rtlCol="0" anchor="ctr"/>
+          <a:lstStyle/>
+          <a:p>
+            <a:pPr algn="ctr"/>
+            <a:endParaRPr lang="en-US"/>
+          </a:p>
+        </p:txBody>
+      </p:sp>
+      <p:sp>
+        <p:nvSpPr>
+          <p:cNvPr id="10" name="TextBox 9">
+            <a:extLst>
+              <a:ext uri="{FF2B5EF4-FFF2-40B4-BE49-F238E27FC236}">
+                <a16:creationId xmlns:a16="http://schemas.microsoft.com/office/drawing/2014/main" id="{3285B259-8C35-EFE1-42AD-47FF24C4C84E}"/>
+              </a:ext>
+            </a:extLst>
+          </p:cNvPr>
+          <p:cNvSpPr txBox="1"/>
+          <p:nvPr/>
+        </p:nvSpPr>
+        <p:spPr>
+          <a:xfrm>
+            <a:off x="3597169" y="3076277"/>
+            <a:ext cx="942532" cy="369332"/>
+          </a:xfrm>
+          <a:prstGeom prst="rect">
+            <a:avLst/>
+          </a:prstGeom>
+          <a:noFill/>
+        </p:spPr>
+        <p:txBody>
+          <a:bodyPr wrap="square" rtlCol="0">
+            <a:spAutoFit/>
+          </a:bodyPr>
+          <a:lstStyle/>
+          <a:p>
+            <a:r>
+              <a:rPr lang="en-US" dirty="0">
+                <a:solidFill>
+                  <a:schemeClr val="bg1"/>
+                </a:solidFill>
+              </a:rPr>
+              <a:t>Search</a:t>
+            </a:r>
+          </a:p>
+        </p:txBody>
+      </p:sp>
+      <p:sp>
+        <p:nvSpPr>
+          <p:cNvPr id="14" name="TextBox 13">
+            <a:extLst>
+              <a:ext uri="{FF2B5EF4-FFF2-40B4-BE49-F238E27FC236}">
+                <a16:creationId xmlns:a16="http://schemas.microsoft.com/office/drawing/2014/main" id="{05C40C7D-BCF5-0DD3-E3D1-DCFE195D975F}"/>
+              </a:ext>
+            </a:extLst>
+          </p:cNvPr>
+          <p:cNvSpPr txBox="1"/>
+          <p:nvPr/>
+        </p:nvSpPr>
+        <p:spPr>
+          <a:xfrm>
+            <a:off x="2306828" y="3577010"/>
+            <a:ext cx="961271" cy="369332"/>
+          </a:xfrm>
+          <a:prstGeom prst="rect">
+            <a:avLst/>
+          </a:prstGeom>
+          <a:noFill/>
+        </p:spPr>
+        <p:txBody>
+          <a:bodyPr wrap="square" rtlCol="0">
+            <a:spAutoFit/>
+          </a:bodyPr>
+          <a:lstStyle/>
+          <a:p>
+            <a:r>
+              <a:rPr lang="en-US" dirty="0">
+                <a:solidFill>
+                  <a:schemeClr val="bg1"/>
+                </a:solidFill>
+              </a:rPr>
+              <a:t>Search</a:t>
+            </a:r>
+          </a:p>
+        </p:txBody>
+      </p:sp>
+      <p:sp>
+        <p:nvSpPr>
+          <p:cNvPr id="16" name="Rectangle 15">
+            <a:extLst>
+              <a:ext uri="{FF2B5EF4-FFF2-40B4-BE49-F238E27FC236}">
+                <a16:creationId xmlns:a16="http://schemas.microsoft.com/office/drawing/2014/main" id="{4A5D7CC8-E940-DC9A-A5AF-051BCA4C0A3C}"/>
+              </a:ext>
+            </a:extLst>
+          </p:cNvPr>
+          <p:cNvSpPr/>
+          <p:nvPr/>
+        </p:nvSpPr>
+        <p:spPr>
+          <a:xfrm>
+            <a:off x="1241329" y="3577010"/>
+            <a:ext cx="4922190" cy="2499699"/>
+          </a:xfrm>
+          <a:prstGeom prst="rect">
+            <a:avLst/>
+          </a:prstGeom>
+          <a:solidFill>
+            <a:schemeClr val="bg1"/>
+          </a:solidFill>
+        </p:spPr>
+        <p:style>
+          <a:lnRef idx="2">
+            <a:schemeClr val="accent1">
+              <a:shade val="15000"/>
+            </a:schemeClr>
+          </a:lnRef>
+          <a:fillRef idx="1">
+            <a:schemeClr val="accent1"/>
+          </a:fillRef>
+          <a:effectRef idx="0">
+            <a:schemeClr val="accent1"/>
+          </a:effectRef>
+          <a:fontRef idx="minor">
+            <a:schemeClr val="lt1"/>
+          </a:fontRef>
+        </p:style>
+        <p:txBody>
+          <a:bodyPr rtlCol="0" anchor="ctr"/>
+          <a:lstStyle/>
+          <a:p>
+            <a:pPr algn="ctr"/>
+            <a:endParaRPr lang="en-US"/>
+          </a:p>
+        </p:txBody>
+      </p:sp>
+      <p:sp>
+        <p:nvSpPr>
+          <p:cNvPr id="17" name="TextBox 16">
+            <a:extLst>
+              <a:ext uri="{FF2B5EF4-FFF2-40B4-BE49-F238E27FC236}">
+                <a16:creationId xmlns:a16="http://schemas.microsoft.com/office/drawing/2014/main" id="{74610DF2-1102-D3FC-194F-3D05B1A47ED9}"/>
+              </a:ext>
+            </a:extLst>
+          </p:cNvPr>
+          <p:cNvSpPr txBox="1"/>
+          <p:nvPr/>
+        </p:nvSpPr>
+        <p:spPr>
+          <a:xfrm>
+            <a:off x="1377387" y="3704368"/>
+            <a:ext cx="4718613" cy="1200329"/>
+          </a:xfrm>
+          <a:prstGeom prst="rect">
+            <a:avLst/>
+          </a:prstGeom>
+          <a:noFill/>
+        </p:spPr>
+        <p:txBody>
+          <a:bodyPr wrap="square" rtlCol="0">
+            <a:spAutoFit/>
+          </a:bodyPr>
+          <a:lstStyle/>
+          <a:p>
             <a:pPr marL="285750" indent="-285750">
               <a:buFont typeface="Wingdings" panose="05000000000000000000" pitchFamily="2" charset="2"/>
               <a:buChar char="q"/>
@@ -7473,6 +8300,16 @@
             <a:r>
               <a:rPr lang="en-US" dirty="0"/>
               <a:t>Facility</a:t>
+            </a:r>
+          </a:p>
+          <a:p>
+            <a:pPr marL="285750" indent="-285750">
+              <a:buFont typeface="Wingdings" panose="05000000000000000000" pitchFamily="2" charset="2"/>
+              <a:buChar char="q"/>
+            </a:pPr>
+            <a:r>
+              <a:rPr lang="en-US" dirty="0"/>
+              <a:t>Student Related Resource</a:t>
             </a:r>
           </a:p>
         </p:txBody>

</xml_diff>

<commit_message>
Added geo map to individual resource view
</commit_message>
<xml_diff>
--- a/Mock Slides.pptx
+++ b/Mock Slides.pptx
@@ -7523,8 +7523,8 @@
         </p:nvSpPr>
         <p:spPr>
           <a:xfrm>
-            <a:off x="5275519" y="3312536"/>
-            <a:ext cx="5604134" cy="3031599"/>
+            <a:off x="5175327" y="3201326"/>
+            <a:ext cx="3506973" cy="3493264"/>
           </a:xfrm>
           <a:prstGeom prst="rect">
             <a:avLst/>
@@ -7727,6 +7727,42 @@
           </a:p>
         </p:txBody>
       </p:sp>
+      <p:pic>
+        <p:nvPicPr>
+          <p:cNvPr id="30" name="Picture 29" descr="A map with red and blue points&#10;&#10;Description automatically generated">
+            <a:extLst>
+              <a:ext uri="{FF2B5EF4-FFF2-40B4-BE49-F238E27FC236}">
+                <a16:creationId xmlns:a16="http://schemas.microsoft.com/office/drawing/2014/main" id="{C9F8A4B9-687E-7751-5B2C-2C3FAD5C52D7}"/>
+              </a:ext>
+            </a:extLst>
+          </p:cNvPr>
+          <p:cNvPicPr>
+            <a:picLocks noChangeAspect="1"/>
+          </p:cNvPicPr>
+          <p:nvPr/>
+        </p:nvPicPr>
+        <p:blipFill>
+          <a:blip r:embed="rId8">
+            <a:extLst>
+              <a:ext uri="{28A0092B-C50C-407E-A947-70E740481C1C}">
+                <a14:useLocalDpi xmlns:a14="http://schemas.microsoft.com/office/drawing/2010/main" val="0"/>
+              </a:ext>
+            </a:extLst>
+          </a:blip>
+          <a:stretch>
+            <a:fillRect/>
+          </a:stretch>
+        </p:blipFill>
+        <p:spPr>
+          <a:xfrm>
+            <a:off x="8710652" y="3299242"/>
+            <a:ext cx="2164952" cy="2647902"/>
+          </a:xfrm>
+          <a:prstGeom prst="rect">
+            <a:avLst/>
+          </a:prstGeom>
+        </p:spPr>
+      </p:pic>
     </p:spTree>
     <p:extLst>
       <p:ext uri="{BB962C8B-B14F-4D97-AF65-F5344CB8AC3E}">

</xml_diff>